<commit_message>
Issue 1075: Adjust 'features' page to cater for 'sessions' Update Issue 1075
</commit_message>
<xml_diff>
--- a/doc/mockups/features-screenshots/feature3-createEval.pptx
+++ b/doc/mockups/features-screenshots/feature3-createEval.pptx
@@ -201,7 +201,7 @@
           <a:p>
             <a:fld id="{EAF9FAEA-64EF-4413-A2DA-12DBF9C0B08C}" type="datetimeFigureOut">
               <a:rPr lang="en-SG" smtClean="0"/>
-              <a:t>20/3/2013</a:t>
+              <a:t>31/7/2013</a:t>
             </a:fld>
             <a:endParaRPr lang="en-SG"/>
           </a:p>
@@ -734,7 +734,7 @@
             <a:fld id="{B0544CA6-0BFF-4F49-885A-88A3CCAE5331}" type="datetimeFigureOut">
               <a:rPr lang="en-SG" smtClean="0"/>
               <a:pPr/>
-              <a:t>20/3/2013</a:t>
+              <a:t>31/7/2013</a:t>
             </a:fld>
             <a:endParaRPr lang="en-SG"/>
           </a:p>
@@ -901,7 +901,7 @@
             <a:fld id="{B0544CA6-0BFF-4F49-885A-88A3CCAE5331}" type="datetimeFigureOut">
               <a:rPr lang="en-SG" smtClean="0"/>
               <a:pPr/>
-              <a:t>20/3/2013</a:t>
+              <a:t>31/7/2013</a:t>
             </a:fld>
             <a:endParaRPr lang="en-SG"/>
           </a:p>
@@ -1078,7 +1078,7 @@
             <a:fld id="{B0544CA6-0BFF-4F49-885A-88A3CCAE5331}" type="datetimeFigureOut">
               <a:rPr lang="en-SG" smtClean="0"/>
               <a:pPr/>
-              <a:t>20/3/2013</a:t>
+              <a:t>31/7/2013</a:t>
             </a:fld>
             <a:endParaRPr lang="en-SG"/>
           </a:p>
@@ -1245,7 +1245,7 @@
             <a:fld id="{B0544CA6-0BFF-4F49-885A-88A3CCAE5331}" type="datetimeFigureOut">
               <a:rPr lang="en-SG" smtClean="0"/>
               <a:pPr/>
-              <a:t>20/3/2013</a:t>
+              <a:t>31/7/2013</a:t>
             </a:fld>
             <a:endParaRPr lang="en-SG"/>
           </a:p>
@@ -1488,7 +1488,7 @@
             <a:fld id="{B0544CA6-0BFF-4F49-885A-88A3CCAE5331}" type="datetimeFigureOut">
               <a:rPr lang="en-SG" smtClean="0"/>
               <a:pPr/>
-              <a:t>20/3/2013</a:t>
+              <a:t>31/7/2013</a:t>
             </a:fld>
             <a:endParaRPr lang="en-SG"/>
           </a:p>
@@ -1773,7 +1773,7 @@
             <a:fld id="{B0544CA6-0BFF-4F49-885A-88A3CCAE5331}" type="datetimeFigureOut">
               <a:rPr lang="en-SG" smtClean="0"/>
               <a:pPr/>
-              <a:t>20/3/2013</a:t>
+              <a:t>31/7/2013</a:t>
             </a:fld>
             <a:endParaRPr lang="en-SG"/>
           </a:p>
@@ -2192,7 +2192,7 @@
             <a:fld id="{B0544CA6-0BFF-4F49-885A-88A3CCAE5331}" type="datetimeFigureOut">
               <a:rPr lang="en-SG" smtClean="0"/>
               <a:pPr/>
-              <a:t>20/3/2013</a:t>
+              <a:t>31/7/2013</a:t>
             </a:fld>
             <a:endParaRPr lang="en-SG"/>
           </a:p>
@@ -2307,7 +2307,7 @@
             <a:fld id="{B0544CA6-0BFF-4F49-885A-88A3CCAE5331}" type="datetimeFigureOut">
               <a:rPr lang="en-SG" smtClean="0"/>
               <a:pPr/>
-              <a:t>20/3/2013</a:t>
+              <a:t>31/7/2013</a:t>
             </a:fld>
             <a:endParaRPr lang="en-SG"/>
           </a:p>
@@ -2399,7 +2399,7 @@
             <a:fld id="{B0544CA6-0BFF-4F49-885A-88A3CCAE5331}" type="datetimeFigureOut">
               <a:rPr lang="en-SG" smtClean="0"/>
               <a:pPr/>
-              <a:t>20/3/2013</a:t>
+              <a:t>31/7/2013</a:t>
             </a:fld>
             <a:endParaRPr lang="en-SG"/>
           </a:p>
@@ -2673,7 +2673,7 @@
             <a:fld id="{B0544CA6-0BFF-4F49-885A-88A3CCAE5331}" type="datetimeFigureOut">
               <a:rPr lang="en-SG" smtClean="0"/>
               <a:pPr/>
-              <a:t>20/3/2013</a:t>
+              <a:t>31/7/2013</a:t>
             </a:fld>
             <a:endParaRPr lang="en-SG"/>
           </a:p>
@@ -2923,7 +2923,7 @@
             <a:fld id="{B0544CA6-0BFF-4F49-885A-88A3CCAE5331}" type="datetimeFigureOut">
               <a:rPr lang="en-SG" smtClean="0"/>
               <a:pPr/>
-              <a:t>20/3/2013</a:t>
+              <a:t>31/7/2013</a:t>
             </a:fld>
             <a:endParaRPr lang="en-SG"/>
           </a:p>
@@ -3133,7 +3133,7 @@
             <a:fld id="{B0544CA6-0BFF-4F49-885A-88A3CCAE5331}" type="datetimeFigureOut">
               <a:rPr lang="en-SG" smtClean="0"/>
               <a:pPr/>
-              <a:t>20/3/2013</a:t>
+              <a:t>31/7/2013</a:t>
             </a:fld>
             <a:endParaRPr lang="en-SG"/>
           </a:p>
@@ -3596,7 +3596,11 @@
           <a:p>
             <a:r>
               <a:rPr lang="en-US" sz="1200" b="1" dirty="0" smtClean="0"/>
-              <a:t>3. Create a new Evaluation</a:t>
+              <a:t>3. Create a new </a:t>
+            </a:r>
+            <a:r>
+              <a:rPr lang="en-US" sz="1200" b="1" dirty="0" smtClean="0"/>
+              <a:t>session</a:t>
             </a:r>
             <a:endParaRPr lang="en-SG" sz="1200" b="1" dirty="0"/>
           </a:p>

</xml_diff>